<commit_message>
50Hz cutoff instead of 40
</commit_message>
<xml_diff>
--- a/presentations_and_figures/240213.pptx
+++ b/presentations_and_figures/240213.pptx
@@ -18,6 +18,7 @@
     <p:sldId id="298" r:id="rId12"/>
     <p:sldId id="288" r:id="rId13"/>
     <p:sldId id="285" r:id="rId14"/>
+    <p:sldId id="299" r:id="rId15"/>
   </p:sldIdLst>
   <p:sldSz cx="12192000" cy="6858000"/>
   <p:notesSz cx="6858000" cy="9144000"/>
@@ -3908,6 +3909,78 @@
 </p:sld>
 </file>
 
+<file path=ppt/slides/slide14.xml><?xml version="1.0" encoding="utf-8"?>
+<p:sld xmlns:a="http://schemas.openxmlformats.org/drawingml/2006/main" xmlns:r="http://schemas.openxmlformats.org/officeDocument/2006/relationships" xmlns:p="http://schemas.openxmlformats.org/presentationml/2006/main">
+  <p:cSld>
+    <p:spTree>
+      <p:nvGrpSpPr>
+        <p:cNvPr id="1" name=""/>
+        <p:cNvGrpSpPr/>
+        <p:nvPr/>
+      </p:nvGrpSpPr>
+      <p:grpSpPr>
+        <a:xfrm>
+          <a:off x="0" y="0"/>
+          <a:ext cx="0" cy="0"/>
+          <a:chOff x="0" y="0"/>
+          <a:chExt cx="0" cy="0"/>
+        </a:xfrm>
+      </p:grpSpPr>
+      <p:sp>
+        <p:nvSpPr>
+          <p:cNvPr id="2" name="Title 1">
+            <a:extLst>
+              <a:ext uri="{FF2B5EF4-FFF2-40B4-BE49-F238E27FC236}">
+                <a16:creationId xmlns:a16="http://schemas.microsoft.com/office/drawing/2014/main" id="{C84FA0E9-798D-DF27-7233-6D95D2E2DEC8}"/>
+              </a:ext>
+            </a:extLst>
+          </p:cNvPr>
+          <p:cNvSpPr>
+            <a:spLocks noGrp="1"/>
+          </p:cNvSpPr>
+          <p:nvPr>
+            <p:ph type="title"/>
+          </p:nvPr>
+        </p:nvSpPr>
+        <p:spPr>
+          <a:xfrm>
+            <a:off x="0" y="0"/>
+            <a:ext cx="10515600" cy="544356"/>
+          </a:xfrm>
+        </p:spPr>
+        <p:txBody>
+          <a:bodyPr>
+            <a:normAutofit/>
+          </a:bodyPr>
+          <a:lstStyle/>
+          <a:p>
+            <a:r>
+              <a:rPr lang="en-US" sz="2400" b="1">
+                <a:latin typeface="Arial" panose="020B0604020202020204" pitchFamily="34" charset="0"/>
+                <a:cs typeface="Arial" panose="020B0604020202020204" pitchFamily="34" charset="0"/>
+              </a:rPr>
+              <a:t>temp</a:t>
+            </a:r>
+            <a:endParaRPr lang="en-US" sz="2400" b="1" dirty="0">
+              <a:latin typeface="Arial" panose="020B0604020202020204" pitchFamily="34" charset="0"/>
+              <a:cs typeface="Arial" panose="020B0604020202020204" pitchFamily="34" charset="0"/>
+            </a:endParaRPr>
+          </a:p>
+        </p:txBody>
+      </p:sp>
+    </p:spTree>
+    <p:extLst>
+      <p:ext uri="{BB962C8B-B14F-4D97-AF65-F5344CB8AC3E}">
+        <p14:creationId xmlns:p14="http://schemas.microsoft.com/office/powerpoint/2010/main" val="1140598672"/>
+      </p:ext>
+    </p:extLst>
+  </p:cSld>
+  <p:clrMapOvr>
+    <a:masterClrMapping/>
+  </p:clrMapOvr>
+</p:sld>
+</file>
+
 <file path=ppt/slides/slide2.xml><?xml version="1.0" encoding="utf-8"?>
 <p:sld xmlns:a="http://schemas.openxmlformats.org/drawingml/2006/main" xmlns:r="http://schemas.openxmlformats.org/officeDocument/2006/relationships" xmlns:p="http://schemas.openxmlformats.org/presentationml/2006/main">
   <p:cSld>

</xml_diff>

<commit_message>
about to try nhigher thresholds
</commit_message>
<xml_diff>
--- a/presentations_and_figures/240213.pptx
+++ b/presentations_and_figures/240213.pptx
@@ -3955,19 +3955,75 @@
           <a:lstStyle/>
           <a:p>
             <a:r>
-              <a:rPr lang="en-US" sz="2400" b="1">
+              <a:rPr lang="en-US" sz="2400" b="1" dirty="0">
                 <a:latin typeface="Arial" panose="020B0604020202020204" pitchFamily="34" charset="0"/>
                 <a:cs typeface="Arial" panose="020B0604020202020204" pitchFamily="34" charset="0"/>
               </a:rPr>
               <a:t>temp</a:t>
             </a:r>
-            <a:endParaRPr lang="en-US" sz="2400" b="1" dirty="0">
-              <a:latin typeface="Arial" panose="020B0604020202020204" pitchFamily="34" charset="0"/>
-              <a:cs typeface="Arial" panose="020B0604020202020204" pitchFamily="34" charset="0"/>
-            </a:endParaRPr>
-          </a:p>
-        </p:txBody>
-      </p:sp>
+          </a:p>
+        </p:txBody>
+      </p:sp>
+      <p:pic>
+        <p:nvPicPr>
+          <p:cNvPr id="3" name="Picture 2">
+            <a:extLst>
+              <a:ext uri="{FF2B5EF4-FFF2-40B4-BE49-F238E27FC236}">
+                <a16:creationId xmlns:a16="http://schemas.microsoft.com/office/drawing/2014/main" id="{3200C199-F1F1-FB45-EC93-EC6719433C9A}"/>
+              </a:ext>
+            </a:extLst>
+          </p:cNvPr>
+          <p:cNvPicPr>
+            <a:picLocks noChangeAspect="1"/>
+          </p:cNvPicPr>
+          <p:nvPr/>
+        </p:nvPicPr>
+        <p:blipFill>
+          <a:blip r:embed="rId2"/>
+          <a:stretch>
+            <a:fillRect/>
+          </a:stretch>
+        </p:blipFill>
+        <p:spPr>
+          <a:xfrm>
+            <a:off x="0" y="4948678"/>
+            <a:ext cx="11857049" cy="3818643"/>
+          </a:xfrm>
+          <a:prstGeom prst="rect">
+            <a:avLst/>
+          </a:prstGeom>
+        </p:spPr>
+      </p:pic>
+      <p:pic>
+        <p:nvPicPr>
+          <p:cNvPr id="4" name="Picture 3">
+            <a:extLst>
+              <a:ext uri="{FF2B5EF4-FFF2-40B4-BE49-F238E27FC236}">
+                <a16:creationId xmlns:a16="http://schemas.microsoft.com/office/drawing/2014/main" id="{2AD58810-3D08-ADA9-304C-5752534596DA}"/>
+              </a:ext>
+            </a:extLst>
+          </p:cNvPr>
+          <p:cNvPicPr>
+            <a:picLocks noChangeAspect="1"/>
+          </p:cNvPicPr>
+          <p:nvPr/>
+        </p:nvPicPr>
+        <p:blipFill>
+          <a:blip r:embed="rId3"/>
+          <a:stretch>
+            <a:fillRect/>
+          </a:stretch>
+        </p:blipFill>
+        <p:spPr>
+          <a:xfrm>
+            <a:off x="306048" y="700993"/>
+            <a:ext cx="11857049" cy="3818643"/>
+          </a:xfrm>
+          <a:prstGeom prst="rect">
+            <a:avLst/>
+          </a:prstGeom>
+        </p:spPr>
+      </p:pic>
     </p:spTree>
     <p:extLst>
       <p:ext uri="{BB962C8B-B14F-4D97-AF65-F5344CB8AC3E}">

</xml_diff>